<commit_message>
Slide separatation channel part update
</commit_message>
<xml_diff>
--- a/Freshman_Training_Signal.pptx
+++ b/Freshman_Training_Signal.pptx
@@ -4264,7 +4264,7 @@
           <p:cNvPr id="20" name="Group 19">
             <a:extLst>
               <a:ext uri="{FF2B5EF4-FFF2-40B4-BE49-F238E27FC236}">
-                <a16:creationId xmlns="" xmlns:a16="http://schemas.microsoft.com/office/drawing/2014/main" id="{C3ED851A-5624-9445-94A3-FC256390EFF0}"/>
+                <a16:creationId xmlns:a16="http://schemas.microsoft.com/office/drawing/2014/main" xmlns="" id="{C3ED851A-5624-9445-94A3-FC256390EFF0}"/>
               </a:ext>
             </a:extLst>
           </p:cNvPr>
@@ -4284,7 +4284,7 @@
             <p:cNvPr id="21" name="箭號: 五邊形 12">
               <a:extLst>
                 <a:ext uri="{FF2B5EF4-FFF2-40B4-BE49-F238E27FC236}">
-                  <a16:creationId xmlns="" xmlns:a16="http://schemas.microsoft.com/office/drawing/2014/main" id="{7DED8486-E1FD-814E-B2DE-F488A3CEA671}"/>
+                  <a16:creationId xmlns:a16="http://schemas.microsoft.com/office/drawing/2014/main" xmlns="" id="{7DED8486-E1FD-814E-B2DE-F488A3CEA671}"/>
                 </a:ext>
               </a:extLst>
             </p:cNvPr>
@@ -4336,7 +4336,7 @@
             <p:cNvPr id="23" name="箭號: 五邊形 12">
               <a:extLst>
                 <a:ext uri="{FF2B5EF4-FFF2-40B4-BE49-F238E27FC236}">
-                  <a16:creationId xmlns="" xmlns:a16="http://schemas.microsoft.com/office/drawing/2014/main" id="{8C392F49-5181-FA4B-9412-A387B34C316C}"/>
+                  <a16:creationId xmlns:a16="http://schemas.microsoft.com/office/drawing/2014/main" xmlns="" id="{8C392F49-5181-FA4B-9412-A387B34C316C}"/>
                 </a:ext>
               </a:extLst>
             </p:cNvPr>
@@ -4395,7 +4395,7 @@
             <p:cNvPr id="26" name="箭號: 五邊形 12">
               <a:extLst>
                 <a:ext uri="{FF2B5EF4-FFF2-40B4-BE49-F238E27FC236}">
-                  <a16:creationId xmlns="" xmlns:a16="http://schemas.microsoft.com/office/drawing/2014/main" id="{A2A2AEE9-8884-2D45-AA3A-3CE8B669A441}"/>
+                  <a16:creationId xmlns:a16="http://schemas.microsoft.com/office/drawing/2014/main" xmlns="" id="{A2A2AEE9-8884-2D45-AA3A-3CE8B669A441}"/>
                 </a:ext>
               </a:extLst>
             </p:cNvPr>
@@ -4824,7 +4824,7 @@
           <p:cNvPr id="34" name="Text Placeholder 3">
             <a:extLst>
               <a:ext uri="{FF2B5EF4-FFF2-40B4-BE49-F238E27FC236}">
-                <a16:creationId xmlns="" xmlns:a16="http://schemas.microsoft.com/office/drawing/2014/main" id="{CB4F27FF-A5B2-0945-A886-8994C9CF0F9A}"/>
+                <a16:creationId xmlns:a16="http://schemas.microsoft.com/office/drawing/2014/main" xmlns="" id="{CB4F27FF-A5B2-0945-A886-8994C9CF0F9A}"/>
               </a:ext>
             </a:extLst>
           </p:cNvPr>
@@ -4878,7 +4878,7 @@
           <p:cNvPr id="35" name="Content Placeholder 5">
             <a:extLst>
               <a:ext uri="{FF2B5EF4-FFF2-40B4-BE49-F238E27FC236}">
-                <a16:creationId xmlns="" xmlns:a16="http://schemas.microsoft.com/office/drawing/2014/main" id="{1CE5651F-F4F6-9D45-A553-66B6FFCA522B}"/>
+                <a16:creationId xmlns:a16="http://schemas.microsoft.com/office/drawing/2014/main" xmlns="" id="{1CE5651F-F4F6-9D45-A553-66B6FFCA522B}"/>
               </a:ext>
             </a:extLst>
           </p:cNvPr>
@@ -4926,7 +4926,7 @@
           <p:cNvPr id="6" name="Picture 5">
             <a:extLst>
               <a:ext uri="{FF2B5EF4-FFF2-40B4-BE49-F238E27FC236}">
-                <a16:creationId xmlns="" xmlns:a16="http://schemas.microsoft.com/office/drawing/2014/main" id="{5BB22815-3E3B-0B48-9DCA-B05C2D5B9D70}"/>
+                <a16:creationId xmlns:a16="http://schemas.microsoft.com/office/drawing/2014/main" xmlns="" id="{5BB22815-3E3B-0B48-9DCA-B05C2D5B9D70}"/>
               </a:ext>
             </a:extLst>
           </p:cNvPr>
@@ -6028,7 +6028,7 @@
           <p:cNvPr id="15" name="直排文字版面配置區 2">
             <a:extLst>
               <a:ext uri="{FF2B5EF4-FFF2-40B4-BE49-F238E27FC236}">
-                <a16:creationId xmlns="" xmlns:a16="http://schemas.microsoft.com/office/drawing/2014/main" id="{5B0754CD-A593-D647-8F43-33A88CDADB61}"/>
+                <a16:creationId xmlns:a16="http://schemas.microsoft.com/office/drawing/2014/main" xmlns="" id="{5B0754CD-A593-D647-8F43-33A88CDADB61}"/>
               </a:ext>
             </a:extLst>
           </p:cNvPr>
@@ -6238,7 +6238,7 @@
           <p:cNvPr id="20" name="Group 19">
             <a:extLst>
               <a:ext uri="{FF2B5EF4-FFF2-40B4-BE49-F238E27FC236}">
-                <a16:creationId xmlns="" xmlns:a16="http://schemas.microsoft.com/office/drawing/2014/main" id="{C3ED851A-5624-9445-94A3-FC256390EFF0}"/>
+                <a16:creationId xmlns:a16="http://schemas.microsoft.com/office/drawing/2014/main" xmlns="" id="{C3ED851A-5624-9445-94A3-FC256390EFF0}"/>
               </a:ext>
             </a:extLst>
           </p:cNvPr>
@@ -6258,7 +6258,7 @@
             <p:cNvPr id="21" name="箭號: 五邊形 12">
               <a:extLst>
                 <a:ext uri="{FF2B5EF4-FFF2-40B4-BE49-F238E27FC236}">
-                  <a16:creationId xmlns="" xmlns:a16="http://schemas.microsoft.com/office/drawing/2014/main" id="{7DED8486-E1FD-814E-B2DE-F488A3CEA671}"/>
+                  <a16:creationId xmlns:a16="http://schemas.microsoft.com/office/drawing/2014/main" xmlns="" id="{7DED8486-E1FD-814E-B2DE-F488A3CEA671}"/>
                 </a:ext>
               </a:extLst>
             </p:cNvPr>
@@ -6310,7 +6310,7 @@
             <p:cNvPr id="23" name="箭號: 五邊形 12">
               <a:extLst>
                 <a:ext uri="{FF2B5EF4-FFF2-40B4-BE49-F238E27FC236}">
-                  <a16:creationId xmlns="" xmlns:a16="http://schemas.microsoft.com/office/drawing/2014/main" id="{8C392F49-5181-FA4B-9412-A387B34C316C}"/>
+                  <a16:creationId xmlns:a16="http://schemas.microsoft.com/office/drawing/2014/main" xmlns="" id="{8C392F49-5181-FA4B-9412-A387B34C316C}"/>
                 </a:ext>
               </a:extLst>
             </p:cNvPr>
@@ -6369,7 +6369,7 @@
             <p:cNvPr id="26" name="箭號: 五邊形 12">
               <a:extLst>
                 <a:ext uri="{FF2B5EF4-FFF2-40B4-BE49-F238E27FC236}">
-                  <a16:creationId xmlns="" xmlns:a16="http://schemas.microsoft.com/office/drawing/2014/main" id="{A2A2AEE9-8884-2D45-AA3A-3CE8B669A441}"/>
+                  <a16:creationId xmlns:a16="http://schemas.microsoft.com/office/drawing/2014/main" xmlns="" id="{A2A2AEE9-8884-2D45-AA3A-3CE8B669A441}"/>
                 </a:ext>
               </a:extLst>
             </p:cNvPr>
@@ -6798,7 +6798,7 @@
           <p:cNvPr id="34" name="Text Placeholder 3">
             <a:extLst>
               <a:ext uri="{FF2B5EF4-FFF2-40B4-BE49-F238E27FC236}">
-                <a16:creationId xmlns="" xmlns:a16="http://schemas.microsoft.com/office/drawing/2014/main" id="{CB4F27FF-A5B2-0945-A886-8994C9CF0F9A}"/>
+                <a16:creationId xmlns:a16="http://schemas.microsoft.com/office/drawing/2014/main" xmlns="" id="{CB4F27FF-A5B2-0945-A886-8994C9CF0F9A}"/>
               </a:ext>
             </a:extLst>
           </p:cNvPr>
@@ -6852,7 +6852,7 @@
           <p:cNvPr id="35" name="Content Placeholder 5">
             <a:extLst>
               <a:ext uri="{FF2B5EF4-FFF2-40B4-BE49-F238E27FC236}">
-                <a16:creationId xmlns="" xmlns:a16="http://schemas.microsoft.com/office/drawing/2014/main" id="{1CE5651F-F4F6-9D45-A553-66B6FFCA522B}"/>
+                <a16:creationId xmlns:a16="http://schemas.microsoft.com/office/drawing/2014/main" xmlns="" id="{1CE5651F-F4F6-9D45-A553-66B6FFCA522B}"/>
               </a:ext>
             </a:extLst>
           </p:cNvPr>
@@ -6900,7 +6900,7 @@
           <p:cNvPr id="6" name="Picture 5">
             <a:extLst>
               <a:ext uri="{FF2B5EF4-FFF2-40B4-BE49-F238E27FC236}">
-                <a16:creationId xmlns="" xmlns:a16="http://schemas.microsoft.com/office/drawing/2014/main" id="{5BB22815-3E3B-0B48-9DCA-B05C2D5B9D70}"/>
+                <a16:creationId xmlns:a16="http://schemas.microsoft.com/office/drawing/2014/main" xmlns="" id="{5BB22815-3E3B-0B48-9DCA-B05C2D5B9D70}"/>
               </a:ext>
             </a:extLst>
           </p:cNvPr>
@@ -7612,7 +7612,7 @@
           <p:cNvPr id="12" name="Group 11">
             <a:extLst>
               <a:ext uri="{FF2B5EF4-FFF2-40B4-BE49-F238E27FC236}">
-                <a16:creationId xmlns="" xmlns:a16="http://schemas.microsoft.com/office/drawing/2014/main" id="{FECCA331-FFA6-F840-9C60-BF25ACF3BDB5}"/>
+                <a16:creationId xmlns:a16="http://schemas.microsoft.com/office/drawing/2014/main" xmlns="" id="{FECCA331-FFA6-F840-9C60-BF25ACF3BDB5}"/>
               </a:ext>
             </a:extLst>
           </p:cNvPr>
@@ -7632,7 +7632,7 @@
             <p:cNvPr id="13" name="箭號: 五邊形 12">
               <a:extLst>
                 <a:ext uri="{FF2B5EF4-FFF2-40B4-BE49-F238E27FC236}">
-                  <a16:creationId xmlns="" xmlns:a16="http://schemas.microsoft.com/office/drawing/2014/main" id="{1ECC6466-4EFD-5345-BC17-67AB57731DB7}"/>
+                  <a16:creationId xmlns:a16="http://schemas.microsoft.com/office/drawing/2014/main" xmlns="" id="{1ECC6466-4EFD-5345-BC17-67AB57731DB7}"/>
                 </a:ext>
               </a:extLst>
             </p:cNvPr>
@@ -7684,7 +7684,7 @@
             <p:cNvPr id="14" name="箭號: 五邊形 12">
               <a:extLst>
                 <a:ext uri="{FF2B5EF4-FFF2-40B4-BE49-F238E27FC236}">
-                  <a16:creationId xmlns="" xmlns:a16="http://schemas.microsoft.com/office/drawing/2014/main" id="{6CF55724-0A99-E64A-AB4C-0938CB62E153}"/>
+                  <a16:creationId xmlns:a16="http://schemas.microsoft.com/office/drawing/2014/main" xmlns="" id="{6CF55724-0A99-E64A-AB4C-0938CB62E153}"/>
                 </a:ext>
               </a:extLst>
             </p:cNvPr>
@@ -7743,7 +7743,7 @@
             <p:cNvPr id="15" name="箭號: 五邊形 12">
               <a:extLst>
                 <a:ext uri="{FF2B5EF4-FFF2-40B4-BE49-F238E27FC236}">
-                  <a16:creationId xmlns="" xmlns:a16="http://schemas.microsoft.com/office/drawing/2014/main" id="{D65D1FB8-4CF4-8B4A-A307-6F7F618C0D88}"/>
+                  <a16:creationId xmlns:a16="http://schemas.microsoft.com/office/drawing/2014/main" xmlns="" id="{D65D1FB8-4CF4-8B4A-A307-6F7F618C0D88}"/>
                 </a:ext>
               </a:extLst>
             </p:cNvPr>
@@ -8052,7 +8052,7 @@
           <p:cNvPr id="5" name="Picture 4">
             <a:extLst>
               <a:ext uri="{FF2B5EF4-FFF2-40B4-BE49-F238E27FC236}">
-                <a16:creationId xmlns="" xmlns:a16="http://schemas.microsoft.com/office/drawing/2014/main" id="{33C27645-19DC-4542-810A-E94761D6E227}"/>
+                <a16:creationId xmlns:a16="http://schemas.microsoft.com/office/drawing/2014/main" xmlns="" id="{33C27645-19DC-4542-810A-E94761D6E227}"/>
               </a:ext>
             </a:extLst>
           </p:cNvPr>
@@ -8551,7 +8551,7 @@
           <p:cNvPr id="23" name="內容版面配置區 2">
             <a:extLst>
               <a:ext uri="{FF2B5EF4-FFF2-40B4-BE49-F238E27FC236}">
-                <a16:creationId xmlns="" xmlns:a16="http://schemas.microsoft.com/office/drawing/2014/main" id="{9D1178A4-A62F-AE47-B4FD-DFBDEBC0B7E1}"/>
+                <a16:creationId xmlns:a16="http://schemas.microsoft.com/office/drawing/2014/main" xmlns="" id="{9D1178A4-A62F-AE47-B4FD-DFBDEBC0B7E1}"/>
               </a:ext>
             </a:extLst>
           </p:cNvPr>
@@ -8698,7 +8698,7 @@
           <p:cNvPr id="24" name="內容版面配置區 2">
             <a:extLst>
               <a:ext uri="{FF2B5EF4-FFF2-40B4-BE49-F238E27FC236}">
-                <a16:creationId xmlns="" xmlns:a16="http://schemas.microsoft.com/office/drawing/2014/main" id="{18BDE748-AF06-9848-B53D-40087470A386}"/>
+                <a16:creationId xmlns:a16="http://schemas.microsoft.com/office/drawing/2014/main" xmlns="" id="{18BDE748-AF06-9848-B53D-40087470A386}"/>
               </a:ext>
             </a:extLst>
           </p:cNvPr>
@@ -9449,7 +9449,7 @@
           <p:cNvPr id="20" name="內容版面配置區 2">
             <a:extLst>
               <a:ext uri="{FF2B5EF4-FFF2-40B4-BE49-F238E27FC236}">
-                <a16:creationId xmlns="" xmlns:a16="http://schemas.microsoft.com/office/drawing/2014/main" id="{9A4A12A5-18A4-CA4A-8E68-97EAFD19927B}"/>
+                <a16:creationId xmlns:a16="http://schemas.microsoft.com/office/drawing/2014/main" xmlns="" id="{9A4A12A5-18A4-CA4A-8E68-97EAFD19927B}"/>
               </a:ext>
             </a:extLst>
           </p:cNvPr>
@@ -9596,7 +9596,7 @@
           <p:cNvPr id="21" name="內容版面配置區 2">
             <a:extLst>
               <a:ext uri="{FF2B5EF4-FFF2-40B4-BE49-F238E27FC236}">
-                <a16:creationId xmlns="" xmlns:a16="http://schemas.microsoft.com/office/drawing/2014/main" id="{E09B3CAD-22B9-BC48-9D7D-2345FF14DD38}"/>
+                <a16:creationId xmlns:a16="http://schemas.microsoft.com/office/drawing/2014/main" xmlns="" id="{E09B3CAD-22B9-BC48-9D7D-2345FF14DD38}"/>
               </a:ext>
             </a:extLst>
           </p:cNvPr>
@@ -10513,7 +10513,7 @@
           <p:cNvPr id="5" name="Group 4">
             <a:extLst>
               <a:ext uri="{FF2B5EF4-FFF2-40B4-BE49-F238E27FC236}">
-                <a16:creationId xmlns="" xmlns:a16="http://schemas.microsoft.com/office/drawing/2014/main" id="{4DADA6C2-E637-F642-95E5-0309E3EB9F41}"/>
+                <a16:creationId xmlns:a16="http://schemas.microsoft.com/office/drawing/2014/main" xmlns="" id="{4DADA6C2-E637-F642-95E5-0309E3EB9F41}"/>
               </a:ext>
             </a:extLst>
           </p:cNvPr>
@@ -10533,7 +10533,7 @@
             <p:cNvPr id="17" name="箭號: 五邊形 12">
               <a:extLst>
                 <a:ext uri="{FF2B5EF4-FFF2-40B4-BE49-F238E27FC236}">
-                  <a16:creationId xmlns="" xmlns:a16="http://schemas.microsoft.com/office/drawing/2014/main" id="{C3424005-2947-5749-B94D-7EE01D59B97D}"/>
+                  <a16:creationId xmlns:a16="http://schemas.microsoft.com/office/drawing/2014/main" xmlns="" id="{C3424005-2947-5749-B94D-7EE01D59B97D}"/>
                 </a:ext>
               </a:extLst>
             </p:cNvPr>
@@ -10585,7 +10585,7 @@
             <p:cNvPr id="16" name="箭號: 五邊形 12">
               <a:extLst>
                 <a:ext uri="{FF2B5EF4-FFF2-40B4-BE49-F238E27FC236}">
-                  <a16:creationId xmlns="" xmlns:a16="http://schemas.microsoft.com/office/drawing/2014/main" id="{78B68587-E393-9C46-A4CA-137BCC2B13AD}"/>
+                  <a16:creationId xmlns:a16="http://schemas.microsoft.com/office/drawing/2014/main" xmlns="" id="{78B68587-E393-9C46-A4CA-137BCC2B13AD}"/>
                 </a:ext>
               </a:extLst>
             </p:cNvPr>
@@ -11053,7 +11053,7 @@
           <p:cNvPr id="18" name="內容版面配置區 2">
             <a:extLst>
               <a:ext uri="{FF2B5EF4-FFF2-40B4-BE49-F238E27FC236}">
-                <a16:creationId xmlns="" xmlns:a16="http://schemas.microsoft.com/office/drawing/2014/main" id="{BB9680E6-3D9F-FF42-BA19-F206A773FE60}"/>
+                <a16:creationId xmlns:a16="http://schemas.microsoft.com/office/drawing/2014/main" xmlns="" id="{BB9680E6-3D9F-FF42-BA19-F206A773FE60}"/>
               </a:ext>
             </a:extLst>
           </p:cNvPr>
@@ -11238,7 +11238,7 @@
           <p:cNvPr id="15" name="Group 14">
             <a:extLst>
               <a:ext uri="{FF2B5EF4-FFF2-40B4-BE49-F238E27FC236}">
-                <a16:creationId xmlns="" xmlns:a16="http://schemas.microsoft.com/office/drawing/2014/main" id="{7108562A-19D8-3347-A5CB-8FD2094D2AC6}"/>
+                <a16:creationId xmlns:a16="http://schemas.microsoft.com/office/drawing/2014/main" xmlns="" id="{7108562A-19D8-3347-A5CB-8FD2094D2AC6}"/>
               </a:ext>
             </a:extLst>
           </p:cNvPr>
@@ -11258,7 +11258,7 @@
             <p:cNvPr id="16" name="箭號: 五邊形 12">
               <a:extLst>
                 <a:ext uri="{FF2B5EF4-FFF2-40B4-BE49-F238E27FC236}">
-                  <a16:creationId xmlns="" xmlns:a16="http://schemas.microsoft.com/office/drawing/2014/main" id="{0350FA7D-8512-F24E-9F36-7F4296D197F2}"/>
+                  <a16:creationId xmlns:a16="http://schemas.microsoft.com/office/drawing/2014/main" xmlns="" id="{0350FA7D-8512-F24E-9F36-7F4296D197F2}"/>
                 </a:ext>
               </a:extLst>
             </p:cNvPr>
@@ -11310,7 +11310,7 @@
             <p:cNvPr id="17" name="箭號: 五邊形 12">
               <a:extLst>
                 <a:ext uri="{FF2B5EF4-FFF2-40B4-BE49-F238E27FC236}">
-                  <a16:creationId xmlns="" xmlns:a16="http://schemas.microsoft.com/office/drawing/2014/main" id="{125DE2BA-1E8B-2447-AEBE-4BDB2873316E}"/>
+                  <a16:creationId xmlns:a16="http://schemas.microsoft.com/office/drawing/2014/main" xmlns="" id="{125DE2BA-1E8B-2447-AEBE-4BDB2873316E}"/>
                 </a:ext>
               </a:extLst>
             </p:cNvPr>
@@ -11369,7 +11369,7 @@
             <p:cNvPr id="18" name="箭號: 五邊形 12">
               <a:extLst>
                 <a:ext uri="{FF2B5EF4-FFF2-40B4-BE49-F238E27FC236}">
-                  <a16:creationId xmlns="" xmlns:a16="http://schemas.microsoft.com/office/drawing/2014/main" id="{467877CF-B77C-BE4F-8D6F-89063BBFC3DE}"/>
+                  <a16:creationId xmlns:a16="http://schemas.microsoft.com/office/drawing/2014/main" xmlns="" id="{467877CF-B77C-BE4F-8D6F-89063BBFC3DE}"/>
                 </a:ext>
               </a:extLst>
             </p:cNvPr>
@@ -11732,7 +11732,7 @@
           <p:cNvPr id="22" name="標題 1">
             <a:extLst>
               <a:ext uri="{FF2B5EF4-FFF2-40B4-BE49-F238E27FC236}">
-                <a16:creationId xmlns="" xmlns:a16="http://schemas.microsoft.com/office/drawing/2014/main" id="{6E193196-9107-784C-A964-C67153D060CB}"/>
+                <a16:creationId xmlns:a16="http://schemas.microsoft.com/office/drawing/2014/main" xmlns="" id="{6E193196-9107-784C-A964-C67153D060CB}"/>
               </a:ext>
             </a:extLst>
           </p:cNvPr>
@@ -11775,7 +11775,7 @@
           <p:cNvPr id="24" name="文字版面配置區 3">
             <a:extLst>
               <a:ext uri="{FF2B5EF4-FFF2-40B4-BE49-F238E27FC236}">
-                <a16:creationId xmlns="" xmlns:a16="http://schemas.microsoft.com/office/drawing/2014/main" id="{5922BEEB-F3AC-E443-B34D-CE264A982284}"/>
+                <a16:creationId xmlns:a16="http://schemas.microsoft.com/office/drawing/2014/main" xmlns="" id="{5922BEEB-F3AC-E443-B34D-CE264A982284}"/>
               </a:ext>
             </a:extLst>
           </p:cNvPr>
@@ -20379,15 +20379,7 @@
                 <a:ea typeface="Times New Roman" charset="0"/>
                 <a:cs typeface="Times New Roman" charset="0"/>
               </a:rPr>
-              <a:t> Transmission </a:t>
-            </a:r>
-            <a:r>
-              <a:rPr lang="en-US" altLang="zh-TW" sz="3200" b="1" dirty="0" smtClean="0">
-                <a:latin typeface="Times New Roman" charset="0"/>
-                <a:ea typeface="Times New Roman" charset="0"/>
-                <a:cs typeface="Times New Roman" charset="0"/>
-              </a:rPr>
-              <a:t>Equation</a:t>
+              <a:t> Transmission Equation</a:t>
             </a:r>
           </a:p>
           <a:p>
@@ -20404,11 +20396,6 @@
               </a:rPr>
               <a:t>Demo</a:t>
             </a:r>
-            <a:endParaRPr lang="en-US" altLang="zh-TW" sz="3200" b="1" dirty="0" smtClean="0">
-              <a:latin typeface="Times New Roman" charset="0"/>
-              <a:ea typeface="Times New Roman" charset="0"/>
-              <a:cs typeface="Times New Roman" charset="0"/>
-            </a:endParaRPr>
           </a:p>
           <a:p>
             <a:pPr>
@@ -20424,11 +20411,6 @@
               </a:rPr>
               <a:t>Reference</a:t>
             </a:r>
-            <a:endParaRPr lang="en-US" altLang="zh-TW" sz="3200" b="1" dirty="0" smtClean="0">
-              <a:latin typeface="Times New Roman" charset="0"/>
-              <a:ea typeface="Times New Roman" charset="0"/>
-              <a:cs typeface="Times New Roman" charset="0"/>
-            </a:endParaRPr>
           </a:p>
           <a:p>
             <a:endParaRPr lang="zh-TW" altLang="en-US" dirty="0"/>
@@ -21098,6 +21080,36 @@
               </a:rPr>
               <a:t>Equation</a:t>
             </a:r>
+          </a:p>
+          <a:p>
+            <a:pPr>
+              <a:lnSpc>
+                <a:spcPct val="150000"/>
+              </a:lnSpc>
+            </a:pPr>
+            <a:r>
+              <a:rPr lang="en-US" altLang="zh-TW" sz="3200" b="1" dirty="0">
+                <a:latin typeface="Times New Roman" charset="0"/>
+                <a:ea typeface="Times New Roman" charset="0"/>
+                <a:cs typeface="Times New Roman" charset="0"/>
+              </a:rPr>
+              <a:t>Demo</a:t>
+            </a:r>
+          </a:p>
+          <a:p>
+            <a:pPr>
+              <a:lnSpc>
+                <a:spcPct val="150000"/>
+              </a:lnSpc>
+            </a:pPr>
+            <a:r>
+              <a:rPr lang="en-US" altLang="zh-TW" sz="3200" b="1" dirty="0" smtClean="0">
+                <a:latin typeface="Times New Roman" charset="0"/>
+                <a:ea typeface="Times New Roman" charset="0"/>
+                <a:cs typeface="Times New Roman" charset="0"/>
+              </a:rPr>
+              <a:t>Reference</a:t>
+            </a:r>
             <a:endParaRPr lang="en-US" altLang="zh-TW" sz="3200" b="1" dirty="0" smtClean="0">
               <a:latin typeface="Times New Roman" charset="0"/>
               <a:ea typeface="Times New Roman" charset="0"/>
@@ -21190,7 +21202,7 @@
         </p:nvSpPr>
         <p:spPr>
           <a:xfrm>
-            <a:off x="335362" y="2416969"/>
+            <a:off x="335362" y="2441032"/>
             <a:ext cx="11521280" cy="4610906"/>
           </a:xfrm>
           <a:prstGeom prst="rect">
@@ -25126,24 +25138,43 @@
                 <a:ea typeface="Times New Roman" charset="0"/>
                 <a:cs typeface="Times New Roman" charset="0"/>
               </a:rPr>
-              <a:t> Transmission </a:t>
-            </a:r>
-            <a:r>
-              <a:rPr lang="en-US" altLang="zh-TW" sz="3200" b="1" dirty="0" smtClean="0">
+              <a:t> Transmission Equation</a:t>
+            </a:r>
+          </a:p>
+          <a:p>
+            <a:pPr>
+              <a:lnSpc>
+                <a:spcPct val="150000"/>
+              </a:lnSpc>
+            </a:pPr>
+            <a:r>
+              <a:rPr lang="en-US" altLang="zh-TW" b="1" dirty="0">
                 <a:latin typeface="Times New Roman" charset="0"/>
                 <a:ea typeface="Times New Roman" charset="0"/>
                 <a:cs typeface="Times New Roman" charset="0"/>
               </a:rPr>
-              <a:t>Equation</a:t>
-            </a:r>
-            <a:endParaRPr lang="en-US" altLang="zh-TW" sz="3200" b="1" dirty="0" smtClean="0">
+              <a:t>Demo</a:t>
+            </a:r>
+          </a:p>
+          <a:p>
+            <a:pPr>
+              <a:lnSpc>
+                <a:spcPct val="150000"/>
+              </a:lnSpc>
+            </a:pPr>
+            <a:r>
+              <a:rPr lang="en-US" altLang="zh-TW" b="1" dirty="0" smtClean="0">
+                <a:latin typeface="Times New Roman" charset="0"/>
+                <a:ea typeface="Times New Roman" charset="0"/>
+                <a:cs typeface="Times New Roman" charset="0"/>
+              </a:rPr>
+              <a:t>Reference</a:t>
+            </a:r>
+            <a:endParaRPr lang="en-US" altLang="zh-TW" b="1" dirty="0">
               <a:latin typeface="Times New Roman" charset="0"/>
               <a:ea typeface="Times New Roman" charset="0"/>
               <a:cs typeface="Times New Roman" charset="0"/>
             </a:endParaRPr>
-          </a:p>
-          <a:p>
-            <a:endParaRPr lang="zh-TW" altLang="en-US" dirty="0"/>
           </a:p>
         </p:txBody>
       </p:sp>

</xml_diff>